<commit_message>
Tweaked some things, added to the powerpoint, just needs reccomendations now.
</commit_message>
<xml_diff>
--- a/Presentation.pptx
+++ b/Presentation.pptx
@@ -5,7 +5,7 @@
     <p:sldMasterId id="2147483648" r:id="rId1"/>
   </p:sldMasterIdLst>
   <p:notesMasterIdLst>
-    <p:notesMasterId r:id="rId17"/>
+    <p:notesMasterId r:id="rId18"/>
   </p:notesMasterIdLst>
   <p:sldIdLst>
     <p:sldId id="256" r:id="rId2"/>
@@ -18,11 +18,12 @@
     <p:sldId id="261" r:id="rId9"/>
     <p:sldId id="266" r:id="rId10"/>
     <p:sldId id="258" r:id="rId11"/>
-    <p:sldId id="257" r:id="rId12"/>
-    <p:sldId id="259" r:id="rId13"/>
-    <p:sldId id="260" r:id="rId14"/>
-    <p:sldId id="267" r:id="rId15"/>
-    <p:sldId id="269" r:id="rId16"/>
+    <p:sldId id="271" r:id="rId12"/>
+    <p:sldId id="257" r:id="rId13"/>
+    <p:sldId id="259" r:id="rId14"/>
+    <p:sldId id="260" r:id="rId15"/>
+    <p:sldId id="267" r:id="rId16"/>
+    <p:sldId id="269" r:id="rId17"/>
   </p:sldIdLst>
   <p:sldSz cx="12192000" cy="6858000"/>
   <p:notesSz cx="6858000" cy="9144000"/>
@@ -121,6 +122,11 @@
       </a:defRPr>
     </a:lvl9pPr>
   </p:defaultTextStyle>
+  <p:extLst>
+    <p:ext uri="{EFAFB233-063F-42B5-8137-9DF3F51BA10A}">
+      <p15:sldGuideLst xmlns:p15="http://schemas.microsoft.com/office/powerpoint/2012/main"/>
+    </p:ext>
+  </p:extLst>
 </p:presentation>
 </file>
 
@@ -519,7 +525,7 @@
           <a:p>
             <a:r>
               <a:rPr lang="en-US" dirty="0"/>
-              <a:t>https://www.barracuda.com/support/glossary/intrusion-detection-system#:~:text=An%20intrusion%20detection%20system%20(IDS,information%20and%20event%20management%20system.</a:t>
+              <a:t>https://www.barracuda.com/support/glossary/intrusion-detection-system#:~:text=An%20intrusion%20detection%20system%20(IDS,information%20and%20event%20management%20system</a:t>
             </a:r>
           </a:p>
           <a:p>
@@ -528,7 +534,7 @@
           <a:p>
             <a:r>
               <a:rPr lang="en-US" dirty="0"/>
-              <a:t>https://csrc.nist.gov/glossary/term/industrial_control_system#:~:text=Industrial%20control%20systems%20include%20supervisory,controllers%20to%20control%20localized%20processes.</a:t>
+              <a:t>https://csrc.nist.gov/glossary/term/industrial_control_system#:~:text=Industrial%20control%20systems%20include%20supervisory,controllers%20to%20control%20localized%20processes</a:t>
             </a:r>
           </a:p>
           <a:p>
@@ -4011,8 +4017,8 @@
         </p:blipFill>
         <p:spPr>
           <a:xfrm>
-            <a:off x="1955837" y="923925"/>
-            <a:ext cx="8280326" cy="4559050"/>
+            <a:off x="1692293" y="584775"/>
+            <a:ext cx="8807413" cy="4849258"/>
           </a:xfrm>
           <a:prstGeom prst="rect">
             <a:avLst/>
@@ -4098,48 +4104,12 @@
           <a:chExt cx="0" cy="0"/>
         </a:xfrm>
       </p:grpSpPr>
-      <p:pic>
-        <p:nvPicPr>
-          <p:cNvPr id="9" name="Picture 8" descr="A graph of a number of people&#10;&#10;Description automatically generated">
-            <a:extLst>
-              <a:ext uri="{FF2B5EF4-FFF2-40B4-BE49-F238E27FC236}">
-                <a16:creationId xmlns:a16="http://schemas.microsoft.com/office/drawing/2014/main" id="{ECDF3599-9922-4F6B-6420-804F98475DAC}"/>
-              </a:ext>
-            </a:extLst>
-          </p:cNvPr>
-          <p:cNvPicPr>
-            <a:picLocks noChangeAspect="1"/>
-          </p:cNvPicPr>
-          <p:nvPr/>
-        </p:nvPicPr>
-        <p:blipFill>
-          <a:blip r:embed="rId3">
-            <a:extLst>
-              <a:ext uri="{28A0092B-C50C-407E-A947-70E740481C1C}">
-                <a14:useLocalDpi xmlns:a14="http://schemas.microsoft.com/office/drawing/2010/main" val="0"/>
-              </a:ext>
-            </a:extLst>
-          </a:blip>
-          <a:stretch>
-            <a:fillRect/>
-          </a:stretch>
-        </p:blipFill>
-        <p:spPr>
-          <a:xfrm>
-            <a:off x="2127496" y="1108211"/>
-            <a:ext cx="7937008" cy="4279400"/>
-          </a:xfrm>
-          <a:prstGeom prst="rect">
-            <a:avLst/>
-          </a:prstGeom>
-        </p:spPr>
-      </p:pic>
-      <p:sp>
-        <p:nvSpPr>
-          <p:cNvPr id="10" name="TextBox 9">
-            <a:extLst>
-              <a:ext uri="{FF2B5EF4-FFF2-40B4-BE49-F238E27FC236}">
-                <a16:creationId xmlns:a16="http://schemas.microsoft.com/office/drawing/2014/main" id="{9E13141A-741B-7438-5901-6334A090B175}"/>
+      <p:sp>
+        <p:nvSpPr>
+          <p:cNvPr id="4" name="TextBox 3">
+            <a:extLst>
+              <a:ext uri="{FF2B5EF4-FFF2-40B4-BE49-F238E27FC236}">
+                <a16:creationId xmlns:a16="http://schemas.microsoft.com/office/drawing/2014/main" id="{A12B2E20-FC2A-4256-EB50-C49C2B2C74C2}"/>
               </a:ext>
             </a:extLst>
           </p:cNvPr>
@@ -4162,18 +4132,83 @@
           </a:bodyPr>
           <a:lstStyle/>
           <a:p>
-            <a:pPr algn="r"/>
-            <a:r>
-              <a:rPr lang="en-US" sz="3200" dirty="0"/>
-              <a:t>Connection States</a:t>
-            </a:r>
-          </a:p>
-        </p:txBody>
-      </p:sp>
+            <a:pPr marL="0" marR="0" lvl="0" indent="0" algn="r" defTabSz="914400" rtl="0" eaLnBrk="1" fontAlgn="auto" latinLnBrk="0" hangingPunct="1">
+              <a:lnSpc>
+                <a:spcPct val="100000"/>
+              </a:lnSpc>
+              <a:spcBef>
+                <a:spcPts val="0"/>
+              </a:spcBef>
+              <a:spcAft>
+                <a:spcPts val="0"/>
+              </a:spcAft>
+              <a:buClrTx/>
+              <a:buSzTx/>
+              <a:buFontTx/>
+              <a:buNone/>
+              <a:tabLst/>
+              <a:defRPr/>
+            </a:pPr>
+            <a:r>
+              <a:rPr kumimoji="0" lang="en-US" sz="3200" b="0" i="0" u="none" strike="noStrike" kern="1200" cap="none" spc="0" normalizeH="0" baseline="0" noProof="0" dirty="0">
+                <a:ln>
+                  <a:noFill/>
+                </a:ln>
+                <a:solidFill>
+                  <a:prstClr val="black"/>
+                </a:solidFill>
+                <a:effectLst/>
+                <a:uLnTx/>
+                <a:uFillTx/>
+                <a:latin typeface="Aptos" panose="02110004020202020204"/>
+                <a:ea typeface="+mn-ea"/>
+                <a:cs typeface="+mn-cs"/>
+              </a:rPr>
+              <a:t>IP of 13 Hour Event</a:t>
+            </a:r>
+          </a:p>
+        </p:txBody>
+      </p:sp>
+      <p:pic>
+        <p:nvPicPr>
+          <p:cNvPr id="5" name="Picture 4" descr="A screen shot of a graph">
+            <a:extLst>
+              <a:ext uri="{FF2B5EF4-FFF2-40B4-BE49-F238E27FC236}">
+                <a16:creationId xmlns:a16="http://schemas.microsoft.com/office/drawing/2014/main" id="{6CFB35BC-DB86-1BF0-21FF-A77E7B6498B7}"/>
+              </a:ext>
+            </a:extLst>
+          </p:cNvPr>
+          <p:cNvPicPr>
+            <a:picLocks noChangeAspect="1"/>
+          </p:cNvPicPr>
+          <p:nvPr/>
+        </p:nvPicPr>
+        <p:blipFill>
+          <a:blip r:embed="rId3">
+            <a:extLst>
+              <a:ext uri="{28A0092B-C50C-407E-A947-70E740481C1C}">
+                <a14:useLocalDpi xmlns:a14="http://schemas.microsoft.com/office/drawing/2010/main" val="0"/>
+              </a:ext>
+            </a:extLst>
+          </a:blip>
+          <a:stretch>
+            <a:fillRect/>
+          </a:stretch>
+        </p:blipFill>
+        <p:spPr>
+          <a:xfrm>
+            <a:off x="1592839" y="584775"/>
+            <a:ext cx="9006322" cy="4958775"/>
+          </a:xfrm>
+          <a:prstGeom prst="rect">
+            <a:avLst/>
+          </a:prstGeom>
+        </p:spPr>
+      </p:pic>
     </p:spTree>
     <p:extLst>
       <p:ext uri="{BB962C8B-B14F-4D97-AF65-F5344CB8AC3E}">
-        <p14:creationId xmlns:p14="http://schemas.microsoft.com/office/powerpoint/2010/main" val="4093397396"/>
+        <p14:creationId xmlns:p14="http://schemas.microsoft.com/office/powerpoint/2010/main" val="230164717"/>
       </p:ext>
     </p:extLst>
   </p:cSld>
@@ -4215,10 +4250,10 @@
       </p:grpSpPr>
       <p:pic>
         <p:nvPicPr>
-          <p:cNvPr id="9" name="Picture 8" descr="A screen shot of a graph&#10;&#10;Description automatically generated">
-            <a:extLst>
-              <a:ext uri="{FF2B5EF4-FFF2-40B4-BE49-F238E27FC236}">
-                <a16:creationId xmlns:a16="http://schemas.microsoft.com/office/drawing/2014/main" id="{12FBFF7E-9285-254D-06A0-1473404786C2}"/>
+          <p:cNvPr id="9" name="Picture 8" descr="A graph of a number of people&#10;&#10;Description automatically generated">
+            <a:extLst>
+              <a:ext uri="{FF2B5EF4-FFF2-40B4-BE49-F238E27FC236}">
+                <a16:creationId xmlns:a16="http://schemas.microsoft.com/office/drawing/2014/main" id="{ECDF3599-9922-4F6B-6420-804F98475DAC}"/>
               </a:ext>
             </a:extLst>
           </p:cNvPr>
@@ -4241,7 +4276,7 @@
         </p:blipFill>
         <p:spPr>
           <a:xfrm>
-            <a:off x="2127496" y="1289300"/>
+            <a:off x="2127496" y="1108211"/>
             <a:ext cx="7937008" cy="4279400"/>
           </a:xfrm>
           <a:prstGeom prst="rect">
@@ -4254,7 +4289,7 @@
           <p:cNvPr id="10" name="TextBox 9">
             <a:extLst>
               <a:ext uri="{FF2B5EF4-FFF2-40B4-BE49-F238E27FC236}">
-                <a16:creationId xmlns:a16="http://schemas.microsoft.com/office/drawing/2014/main" id="{9006C6B3-9430-70CB-F7FD-E05698FD41AB}"/>
+                <a16:creationId xmlns:a16="http://schemas.microsoft.com/office/drawing/2014/main" id="{9E13141A-741B-7438-5901-6334A090B175}"/>
               </a:ext>
             </a:extLst>
           </p:cNvPr>
@@ -4280,7 +4315,7 @@
             <a:pPr algn="r"/>
             <a:r>
               <a:rPr lang="en-US" sz="3200" dirty="0"/>
-              <a:t>Amount of Data from Origin</a:t>
+              <a:t>Connection States</a:t>
             </a:r>
           </a:p>
         </p:txBody>
@@ -4288,7 +4323,7 @@
     </p:spTree>
     <p:extLst>
       <p:ext uri="{BB962C8B-B14F-4D97-AF65-F5344CB8AC3E}">
-        <p14:creationId xmlns:p14="http://schemas.microsoft.com/office/powerpoint/2010/main" val="1625971353"/>
+        <p14:creationId xmlns:p14="http://schemas.microsoft.com/office/powerpoint/2010/main" val="4093397396"/>
       </p:ext>
     </p:extLst>
   </p:cSld>
@@ -4330,10 +4365,10 @@
       </p:grpSpPr>
       <p:pic>
         <p:nvPicPr>
-          <p:cNvPr id="3" name="Picture 2" descr="A screen shot of a graph&#10;&#10;Description automatically generated">
-            <a:extLst>
-              <a:ext uri="{FF2B5EF4-FFF2-40B4-BE49-F238E27FC236}">
-                <a16:creationId xmlns:a16="http://schemas.microsoft.com/office/drawing/2014/main" id="{DDD7EEFD-1122-97D8-B7D8-D920D5917250}"/>
+          <p:cNvPr id="9" name="Picture 8" descr="A screen shot of a graph&#10;&#10;Description automatically generated">
+            <a:extLst>
+              <a:ext uri="{FF2B5EF4-FFF2-40B4-BE49-F238E27FC236}">
+                <a16:creationId xmlns:a16="http://schemas.microsoft.com/office/drawing/2014/main" id="{12FBFF7E-9285-254D-06A0-1473404786C2}"/>
               </a:ext>
             </a:extLst>
           </p:cNvPr>
@@ -4356,8 +4391,8 @@
         </p:blipFill>
         <p:spPr>
           <a:xfrm>
-            <a:off x="2186932" y="1289300"/>
-            <a:ext cx="7818136" cy="4279400"/>
+            <a:off x="2127496" y="1289300"/>
+            <a:ext cx="7937008" cy="4279400"/>
           </a:xfrm>
           <a:prstGeom prst="rect">
             <a:avLst/>
@@ -4366,10 +4401,10 @@
       </p:pic>
       <p:sp>
         <p:nvSpPr>
-          <p:cNvPr id="4" name="TextBox 3">
-            <a:extLst>
-              <a:ext uri="{FF2B5EF4-FFF2-40B4-BE49-F238E27FC236}">
-                <a16:creationId xmlns:a16="http://schemas.microsoft.com/office/drawing/2014/main" id="{FC5E9211-37FD-FDB4-5D18-F8F5F04399B6}"/>
+          <p:cNvPr id="10" name="TextBox 9">
+            <a:extLst>
+              <a:ext uri="{FF2B5EF4-FFF2-40B4-BE49-F238E27FC236}">
+                <a16:creationId xmlns:a16="http://schemas.microsoft.com/office/drawing/2014/main" id="{9006C6B3-9430-70CB-F7FD-E05698FD41AB}"/>
               </a:ext>
             </a:extLst>
           </p:cNvPr>
@@ -4395,7 +4430,42 @@
             <a:pPr algn="r"/>
             <a:r>
               <a:rPr lang="en-US" sz="3200" dirty="0"/>
-              <a:t>Data Sent</a:t>
+              <a:t>Amount of Data from Origin</a:t>
+            </a:r>
+          </a:p>
+        </p:txBody>
+      </p:sp>
+      <p:sp>
+        <p:nvSpPr>
+          <p:cNvPr id="2" name="TextBox 1">
+            <a:extLst>
+              <a:ext uri="{FF2B5EF4-FFF2-40B4-BE49-F238E27FC236}">
+                <a16:creationId xmlns:a16="http://schemas.microsoft.com/office/drawing/2014/main" id="{47432CE9-D12A-56F0-6A60-36D79314D529}"/>
+              </a:ext>
+            </a:extLst>
+          </p:cNvPr>
+          <p:cNvSpPr txBox="1"/>
+          <p:nvPr/>
+        </p:nvSpPr>
+        <p:spPr>
+          <a:xfrm>
+            <a:off x="1200150" y="5568700"/>
+            <a:ext cx="9791700" cy="369332"/>
+          </a:xfrm>
+          <a:prstGeom prst="rect">
+            <a:avLst/>
+          </a:prstGeom>
+          <a:noFill/>
+        </p:spPr>
+        <p:txBody>
+          <a:bodyPr wrap="square" rtlCol="0">
+            <a:spAutoFit/>
+          </a:bodyPr>
+          <a:lstStyle/>
+          <a:p>
+            <a:r>
+              <a:rPr lang="en-US" dirty="0"/>
+              <a:t>The 72.05 MB event is targeting IP 74.91.117.248 and is the only time this IP is seen in the IDS data.</a:t>
             </a:r>
           </a:p>
         </p:txBody>
@@ -4403,7 +4473,7 @@
     </p:spTree>
     <p:extLst>
       <p:ext uri="{BB962C8B-B14F-4D97-AF65-F5344CB8AC3E}">
-        <p14:creationId xmlns:p14="http://schemas.microsoft.com/office/powerpoint/2010/main" val="4238325430"/>
+        <p14:creationId xmlns:p14="http://schemas.microsoft.com/office/powerpoint/2010/main" val="1625971353"/>
       </p:ext>
     </p:extLst>
   </p:cSld>
@@ -4445,6 +4515,121 @@
       </p:grpSpPr>
       <p:pic>
         <p:nvPicPr>
+          <p:cNvPr id="3" name="Picture 2" descr="A screen shot of a graph&#10;&#10;Description automatically generated">
+            <a:extLst>
+              <a:ext uri="{FF2B5EF4-FFF2-40B4-BE49-F238E27FC236}">
+                <a16:creationId xmlns:a16="http://schemas.microsoft.com/office/drawing/2014/main" id="{DDD7EEFD-1122-97D8-B7D8-D920D5917250}"/>
+              </a:ext>
+            </a:extLst>
+          </p:cNvPr>
+          <p:cNvPicPr>
+            <a:picLocks noChangeAspect="1"/>
+          </p:cNvPicPr>
+          <p:nvPr/>
+        </p:nvPicPr>
+        <p:blipFill>
+          <a:blip r:embed="rId3">
+            <a:extLst>
+              <a:ext uri="{28A0092B-C50C-407E-A947-70E740481C1C}">
+                <a14:useLocalDpi xmlns:a14="http://schemas.microsoft.com/office/drawing/2010/main" val="0"/>
+              </a:ext>
+            </a:extLst>
+          </a:blip>
+          <a:stretch>
+            <a:fillRect/>
+          </a:stretch>
+        </p:blipFill>
+        <p:spPr>
+          <a:xfrm>
+            <a:off x="2093591" y="584775"/>
+            <a:ext cx="8004818" cy="4381584"/>
+          </a:xfrm>
+          <a:prstGeom prst="rect">
+            <a:avLst/>
+          </a:prstGeom>
+        </p:spPr>
+      </p:pic>
+      <p:sp>
+        <p:nvSpPr>
+          <p:cNvPr id="4" name="TextBox 3">
+            <a:extLst>
+              <a:ext uri="{FF2B5EF4-FFF2-40B4-BE49-F238E27FC236}">
+                <a16:creationId xmlns:a16="http://schemas.microsoft.com/office/drawing/2014/main" id="{FC5E9211-37FD-FDB4-5D18-F8F5F04399B6}"/>
+              </a:ext>
+            </a:extLst>
+          </p:cNvPr>
+          <p:cNvSpPr txBox="1"/>
+          <p:nvPr/>
+        </p:nvSpPr>
+        <p:spPr>
+          <a:xfrm>
+            <a:off x="0" y="0"/>
+            <a:ext cx="12079224" cy="584775"/>
+          </a:xfrm>
+          <a:prstGeom prst="rect">
+            <a:avLst/>
+          </a:prstGeom>
+          <a:noFill/>
+        </p:spPr>
+        <p:txBody>
+          <a:bodyPr wrap="square" rtlCol="0">
+            <a:spAutoFit/>
+          </a:bodyPr>
+          <a:lstStyle/>
+          <a:p>
+            <a:pPr algn="r"/>
+            <a:r>
+              <a:rPr lang="en-US" sz="3200" dirty="0"/>
+              <a:t>Data Sent</a:t>
+            </a:r>
+          </a:p>
+        </p:txBody>
+      </p:sp>
+    </p:spTree>
+    <p:extLst>
+      <p:ext uri="{BB962C8B-B14F-4D97-AF65-F5344CB8AC3E}">
+        <p14:creationId xmlns:p14="http://schemas.microsoft.com/office/powerpoint/2010/main" val="4238325430"/>
+      </p:ext>
+    </p:extLst>
+  </p:cSld>
+  <p:clrMapOvr>
+    <a:masterClrMapping/>
+  </p:clrMapOvr>
+</p:sld>
+</file>
+
+<file path=ppt/slides/slide15.xml><?xml version="1.0" encoding="utf-8"?>
+<p:sld xmlns:a="http://schemas.openxmlformats.org/drawingml/2006/main" xmlns:r="http://schemas.openxmlformats.org/officeDocument/2006/relationships" xmlns:p="http://schemas.openxmlformats.org/presentationml/2006/main" show="0">
+  <p:cSld>
+    <p:bg>
+      <p:bgPr>
+        <a:blipFill dpi="0" rotWithShape="1">
+          <a:blip r:embed="rId2">
+            <a:alphaModFix amt="60000"/>
+            <a:lum/>
+          </a:blip>
+          <a:srcRect/>
+          <a:tile tx="0" ty="0" sx="100000" sy="100000" flip="none" algn="bl"/>
+        </a:blipFill>
+        <a:effectLst/>
+      </p:bgPr>
+    </p:bg>
+    <p:spTree>
+      <p:nvGrpSpPr>
+        <p:cNvPr id="1" name=""/>
+        <p:cNvGrpSpPr/>
+        <p:nvPr/>
+      </p:nvGrpSpPr>
+      <p:grpSpPr>
+        <a:xfrm>
+          <a:off x="0" y="0"/>
+          <a:ext cx="0" cy="0"/>
+          <a:chOff x="0" y="0"/>
+          <a:chExt cx="0" cy="0"/>
+        </a:xfrm>
+      </p:grpSpPr>
+      <p:pic>
+        <p:nvPicPr>
           <p:cNvPr id="3" name="Picture 2" descr="A blue and red triangle with black text&#10;&#10;Description automatically generated">
             <a:extLst>
               <a:ext uri="{FF2B5EF4-FFF2-40B4-BE49-F238E27FC236}">
@@ -4528,7 +4713,7 @@
 </p:sld>
 </file>
 
-<file path=ppt/slides/slide15.xml><?xml version="1.0" encoding="utf-8"?>
+<file path=ppt/slides/slide16.xml><?xml version="1.0" encoding="utf-8"?>
 <p:sld xmlns:a="http://schemas.openxmlformats.org/drawingml/2006/main" xmlns:r="http://schemas.openxmlformats.org/officeDocument/2006/relationships" xmlns:p="http://schemas.openxmlformats.org/presentationml/2006/main">
   <p:cSld>
     <p:bg>
@@ -4589,7 +4774,42 @@
             <a:pPr algn="r"/>
             <a:r>
               <a:rPr lang="en-US" sz="3200" dirty="0"/>
-              <a:t>IDS Network Traffic</a:t>
+              <a:t>Recommendations</a:t>
+            </a:r>
+          </a:p>
+        </p:txBody>
+      </p:sp>
+      <p:sp>
+        <p:nvSpPr>
+          <p:cNvPr id="3" name="TextBox 2">
+            <a:extLst>
+              <a:ext uri="{FF2B5EF4-FFF2-40B4-BE49-F238E27FC236}">
+                <a16:creationId xmlns:a16="http://schemas.microsoft.com/office/drawing/2014/main" id="{5A9224B9-598F-E26E-8158-779456797605}"/>
+              </a:ext>
+            </a:extLst>
+          </p:cNvPr>
+          <p:cNvSpPr txBox="1"/>
+          <p:nvPr/>
+        </p:nvSpPr>
+        <p:spPr>
+          <a:xfrm>
+            <a:off x="228600" y="485775"/>
+            <a:ext cx="10668000" cy="369332"/>
+          </a:xfrm>
+          <a:prstGeom prst="rect">
+            <a:avLst/>
+          </a:prstGeom>
+          <a:noFill/>
+        </p:spPr>
+        <p:txBody>
+          <a:bodyPr wrap="square" rtlCol="0">
+            <a:spAutoFit/>
+          </a:bodyPr>
+          <a:lstStyle/>
+          <a:p>
+            <a:r>
+              <a:rPr lang="en-US" dirty="0"/>
+              <a:t>Your IDS sucks</a:t>
             </a:r>
           </a:p>
         </p:txBody>
@@ -4673,14 +4893,6 @@
             <a:endParaRPr lang="en-US" sz="2000" dirty="0"/>
           </a:p>
           <a:p>
-            <a:pPr>
-              <a:lnSpc>
-                <a:spcPct val="150000"/>
-              </a:lnSpc>
-            </a:pPr>
-            <a:endParaRPr lang="en-US" sz="2000" dirty="0"/>
-          </a:p>
-          <a:p>
             <a:pPr marL="285750" indent="-285750">
               <a:lnSpc>
                 <a:spcPct val="150000"/>
@@ -4690,7 +4902,7 @@
             </a:pPr>
             <a:r>
               <a:rPr lang="en-US" sz="2000" dirty="0"/>
-              <a:t>Intrusion Detection System (IDS) Breakdown</a:t>
+              <a:t>IDS/ICS Breakdown</a:t>
             </a:r>
           </a:p>
           <a:p>
@@ -4703,7 +4915,7 @@
             </a:pPr>
             <a:r>
               <a:rPr lang="en-US" sz="2000" dirty="0"/>
-              <a:t>Malicious vs Benign Traffic</a:t>
+              <a:t>Protocol Use</a:t>
             </a:r>
           </a:p>
           <a:p>
@@ -4716,7 +4928,7 @@
             </a:pPr>
             <a:r>
               <a:rPr lang="en-US" sz="2000" dirty="0"/>
-              <a:t>Protocols Used</a:t>
+              <a:t>Data Flow</a:t>
             </a:r>
           </a:p>
           <a:p>
@@ -4729,7 +4941,7 @@
             </a:pPr>
             <a:r>
               <a:rPr lang="en-US" sz="2000" dirty="0"/>
-              <a:t>Malicious Traffic - Time on Network</a:t>
+              <a:t>Targeted IP Addresses</a:t>
             </a:r>
           </a:p>
           <a:p>
@@ -4742,7 +4954,7 @@
             </a:pPr>
             <a:r>
               <a:rPr lang="en-US" sz="2000" dirty="0"/>
-              <a:t>Malicious Connection States</a:t>
+              <a:t>Malicious Traffic - Time on Network</a:t>
             </a:r>
           </a:p>
           <a:p>
@@ -4755,7 +4967,7 @@
             </a:pPr>
             <a:r>
               <a:rPr lang="en-US" sz="2000" dirty="0"/>
-              <a:t>Amount of Data Transferred</a:t>
+              <a:t>Malicious Connection States</a:t>
             </a:r>
           </a:p>
           <a:p>
@@ -4768,7 +4980,7 @@
             </a:pPr>
             <a:r>
               <a:rPr lang="en-US" sz="2000" dirty="0"/>
-              <a:t>Targeted IP Addresses</a:t>
+              <a:t>Amount of Data Transferred</a:t>
             </a:r>
           </a:p>
           <a:p>
@@ -4779,7 +4991,23 @@
               <a:buFont typeface="Arial" panose="020B0604020202020204" pitchFamily="34" charset="0"/>
               <a:buChar char="•"/>
             </a:pPr>
-            <a:endParaRPr lang="en-US" sz="2000" dirty="0"/>
+            <a:r>
+              <a:rPr lang="en-US" sz="2000" dirty="0"/>
+              <a:t>Implications and Recommendations</a:t>
+            </a:r>
+          </a:p>
+          <a:p>
+            <a:pPr marL="285750" indent="-285750">
+              <a:lnSpc>
+                <a:spcPct val="150000"/>
+              </a:lnSpc>
+              <a:buFont typeface="Arial" panose="020B0604020202020204" pitchFamily="34" charset="0"/>
+              <a:buChar char="•"/>
+            </a:pPr>
+            <a:r>
+              <a:rPr lang="en-US" sz="2000" dirty="0"/>
+              <a:t>Sources</a:t>
+            </a:r>
           </a:p>
           <a:p>
             <a:pPr marL="285750" indent="-285750">
@@ -6051,42 +6279,6 @@
           <a:chExt cx="0" cy="0"/>
         </a:xfrm>
       </p:grpSpPr>
-      <p:pic>
-        <p:nvPicPr>
-          <p:cNvPr id="3" name="Picture 2" descr="A graph of a bar graph&#10;&#10;Description automatically generated with medium confidence">
-            <a:extLst>
-              <a:ext uri="{FF2B5EF4-FFF2-40B4-BE49-F238E27FC236}">
-                <a16:creationId xmlns:a16="http://schemas.microsoft.com/office/drawing/2014/main" id="{399C2AE8-AD4D-90F7-432A-93324C0F2A69}"/>
-              </a:ext>
-            </a:extLst>
-          </p:cNvPr>
-          <p:cNvPicPr>
-            <a:picLocks noChangeAspect="1"/>
-          </p:cNvPicPr>
-          <p:nvPr/>
-        </p:nvPicPr>
-        <p:blipFill>
-          <a:blip r:embed="rId3">
-            <a:extLst>
-              <a:ext uri="{28A0092B-C50C-407E-A947-70E740481C1C}">
-                <a14:useLocalDpi xmlns:a14="http://schemas.microsoft.com/office/drawing/2010/main" val="0"/>
-              </a:ext>
-            </a:extLst>
-          </a:blip>
-          <a:stretch>
-            <a:fillRect/>
-          </a:stretch>
-        </p:blipFill>
-        <p:spPr>
-          <a:xfrm>
-            <a:off x="2127496" y="950971"/>
-            <a:ext cx="7937008" cy="4956058"/>
-          </a:xfrm>
-          <a:prstGeom prst="rect">
-            <a:avLst/>
-          </a:prstGeom>
-        </p:spPr>
-      </p:pic>
       <p:sp>
         <p:nvSpPr>
           <p:cNvPr id="4" name="TextBox 3">
@@ -6123,6 +6315,42 @@
           </a:p>
         </p:txBody>
       </p:sp>
+      <p:pic>
+        <p:nvPicPr>
+          <p:cNvPr id="5" name="Picture 4" descr="A graph with numbers and a bar">
+            <a:extLst>
+              <a:ext uri="{FF2B5EF4-FFF2-40B4-BE49-F238E27FC236}">
+                <a16:creationId xmlns:a16="http://schemas.microsoft.com/office/drawing/2014/main" id="{58DC8854-B5A1-67D7-8235-71D2CBFD270C}"/>
+              </a:ext>
+            </a:extLst>
+          </p:cNvPr>
+          <p:cNvPicPr>
+            <a:picLocks noChangeAspect="1"/>
+          </p:cNvPicPr>
+          <p:nvPr/>
+        </p:nvPicPr>
+        <p:blipFill>
+          <a:blip r:embed="rId3">
+            <a:extLst>
+              <a:ext uri="{28A0092B-C50C-407E-A947-70E740481C1C}">
+                <a14:useLocalDpi xmlns:a14="http://schemas.microsoft.com/office/drawing/2010/main" val="0"/>
+              </a:ext>
+            </a:extLst>
+          </a:blip>
+          <a:stretch>
+            <a:fillRect/>
+          </a:stretch>
+        </p:blipFill>
+        <p:spPr>
+          <a:xfrm>
+            <a:off x="1834269" y="584775"/>
+            <a:ext cx="8523462" cy="5322254"/>
+          </a:xfrm>
+          <a:prstGeom prst="rect">
+            <a:avLst/>
+          </a:prstGeom>
+        </p:spPr>
+      </p:pic>
     </p:spTree>
     <p:extLst>
       <p:ext uri="{BB962C8B-B14F-4D97-AF65-F5344CB8AC3E}">

</xml_diff>

<commit_message>
Last commit, proofread for formatting
</commit_message>
<xml_diff>
--- a/Presentation.pptx
+++ b/Presentation.pptx
@@ -5954,21 +5954,12 @@
             </a:r>
           </a:p>
           <a:p>
-            <a:pPr marL="342900" marR="0" lvl="0" indent="-342900" algn="l" defTabSz="914400" rtl="0" eaLnBrk="1" fontAlgn="auto" latinLnBrk="0" hangingPunct="1">
+            <a:pPr marL="800100" lvl="1" indent="-342900">
               <a:lnSpc>
                 <a:spcPct val="150000"/>
               </a:lnSpc>
-              <a:spcBef>
-                <a:spcPts val="0"/>
-              </a:spcBef>
-              <a:spcAft>
-                <a:spcPts val="0"/>
-              </a:spcAft>
-              <a:buClrTx/>
-              <a:buSzTx/>
               <a:buFont typeface="Arial" panose="020B0604020202020204" pitchFamily="34" charset="0"/>
               <a:buChar char="•"/>
-              <a:tabLst/>
               <a:defRPr/>
             </a:pPr>
             <a:r>
@@ -5978,7 +5969,7 @@
                 </a:solidFill>
                 <a:latin typeface="Aptos" panose="02110004020202020204"/>
               </a:rPr>
-              <a:t>	For example: Malicious will equal 1 and benign will equal 0</a:t>
+              <a:t>For example: Malicious will equal 1 and benign will equal 0</a:t>
             </a:r>
           </a:p>
           <a:p>

</xml_diff>

<commit_message>
Really, the last one this time
</commit_message>
<xml_diff>
--- a/Presentation.pptx
+++ b/Presentation.pptx
@@ -3862,7 +3862,7 @@
       <p:bgPr>
         <a:blipFill dpi="0" rotWithShape="1">
           <a:blip r:embed="rId2">
-            <a:alphaModFix amt="50000"/>
+            <a:alphaModFix amt="40000"/>
             <a:lum/>
           </a:blip>
           <a:srcRect/>
@@ -3975,7 +3975,7 @@
       <p:bgPr>
         <a:blipFill dpi="0" rotWithShape="1">
           <a:blip r:embed="rId2">
-            <a:alphaModFix amt="50000"/>
+            <a:alphaModFix amt="40000"/>
             <a:lum/>
           </a:blip>
           <a:srcRect/>
@@ -4092,7 +4092,7 @@
       <p:bgPr>
         <a:blipFill dpi="0" rotWithShape="1">
           <a:blip r:embed="rId2">
-            <a:alphaModFix amt="50000"/>
+            <a:alphaModFix amt="40000"/>
             <a:lum/>
           </a:blip>
           <a:srcRect/>
@@ -4209,7 +4209,7 @@
       <p:bgPr>
         <a:blipFill dpi="0" rotWithShape="1">
           <a:blip r:embed="rId2">
-            <a:alphaModFix amt="50000"/>
+            <a:alphaModFix amt="40000"/>
             <a:lum/>
           </a:blip>
           <a:srcRect/>
@@ -4355,7 +4355,7 @@
       <p:bgPr>
         <a:blipFill dpi="0" rotWithShape="1">
           <a:blip r:embed="rId2">
-            <a:alphaModFix amt="50000"/>
+            <a:alphaModFix amt="40000"/>
             <a:lum/>
           </a:blip>
           <a:srcRect/>
@@ -4472,7 +4472,7 @@
       <p:bgPr>
         <a:blipFill dpi="0" rotWithShape="1">
           <a:blip r:embed="rId2">
-            <a:alphaModFix amt="50000"/>
+            <a:alphaModFix amt="40000"/>
             <a:lum/>
           </a:blip>
           <a:srcRect/>
@@ -4624,7 +4624,7 @@
       <p:bgPr>
         <a:blipFill dpi="0" rotWithShape="1">
           <a:blip r:embed="rId2">
-            <a:alphaModFix amt="50000"/>
+            <a:alphaModFix amt="40000"/>
             <a:lum/>
           </a:blip>
           <a:srcRect/>
@@ -4741,7 +4741,7 @@
       <p:bgPr>
         <a:blipFill dpi="0" rotWithShape="1">
           <a:blip r:embed="rId2">
-            <a:alphaModFix amt="50000"/>
+            <a:alphaModFix amt="40000"/>
             <a:lum/>
           </a:blip>
           <a:srcRect/>
@@ -4858,7 +4858,7 @@
       <p:bgPr>
         <a:blipFill dpi="0" rotWithShape="1">
           <a:blip r:embed="rId2">
-            <a:alphaModFix amt="50000"/>
+            <a:alphaModFix amt="40000"/>
             <a:lum/>
           </a:blip>
           <a:srcRect/>
@@ -5160,7 +5160,7 @@
       <p:bgPr>
         <a:blipFill dpi="0" rotWithShape="1">
           <a:blip r:embed="rId2">
-            <a:alphaModFix amt="50000"/>
+            <a:alphaModFix amt="40000"/>
             <a:lum/>
           </a:blip>
           <a:srcRect/>
@@ -5507,7 +5507,7 @@
       <p:bgPr>
         <a:blipFill dpi="0" rotWithShape="1">
           <a:blip r:embed="rId2">
-            <a:alphaModFix amt="50000"/>
+            <a:alphaModFix amt="40000"/>
             <a:lum/>
           </a:blip>
           <a:srcRect/>
@@ -5773,7 +5773,7 @@
       <p:bgPr>
         <a:blipFill dpi="0" rotWithShape="1">
           <a:blip r:embed="rId2">
-            <a:alphaModFix amt="50000"/>
+            <a:alphaModFix amt="40000"/>
             <a:lum/>
           </a:blip>
           <a:srcRect/>
@@ -6226,7 +6226,7 @@
       <p:bgPr>
         <a:blipFill dpi="0" rotWithShape="1">
           <a:blip r:embed="rId3">
-            <a:alphaModFix amt="50000"/>
+            <a:alphaModFix amt="40000"/>
             <a:lum/>
           </a:blip>
           <a:srcRect/>
@@ -6741,7 +6741,7 @@
       <p:bgPr>
         <a:blipFill dpi="0" rotWithShape="1">
           <a:blip r:embed="rId2">
-            <a:alphaModFix amt="50000"/>
+            <a:alphaModFix amt="40000"/>
             <a:lum/>
           </a:blip>
           <a:srcRect/>
@@ -6893,7 +6893,7 @@
       <p:bgPr>
         <a:blipFill dpi="0" rotWithShape="1">
           <a:blip r:embed="rId2">
-            <a:alphaModFix amt="50000"/>
+            <a:alphaModFix amt="40000"/>
             <a:lum/>
           </a:blip>
           <a:srcRect/>
@@ -7010,7 +7010,7 @@
       <p:bgPr>
         <a:blipFill dpi="0" rotWithShape="1">
           <a:blip r:embed="rId2">
-            <a:alphaModFix amt="50000"/>
+            <a:alphaModFix amt="40000"/>
             <a:lum/>
           </a:blip>
           <a:srcRect/>
@@ -7127,7 +7127,7 @@
       <p:bgPr>
         <a:blipFill dpi="0" rotWithShape="1">
           <a:blip r:embed="rId2">
-            <a:alphaModFix amt="50000"/>
+            <a:alphaModFix amt="40000"/>
             <a:lum/>
           </a:blip>
           <a:srcRect/>
@@ -7279,7 +7279,7 @@
       <p:bgPr>
         <a:blipFill dpi="0" rotWithShape="1">
           <a:blip r:embed="rId2">
-            <a:alphaModFix amt="50000"/>
+            <a:alphaModFix amt="40000"/>
             <a:lum/>
           </a:blip>
           <a:srcRect/>

</xml_diff>

<commit_message>
Okay, I changed one more thing. Really done now
</commit_message>
<xml_diff>
--- a/Presentation.pptx
+++ b/Presentation.pptx
@@ -6206,6 +6206,36 @@
           </a:p>
         </p:txBody>
       </p:sp>
+      <p:pic>
+        <p:nvPicPr>
+          <p:cNvPr id="5" name="Picture 4">
+            <a:extLst>
+              <a:ext uri="{FF2B5EF4-FFF2-40B4-BE49-F238E27FC236}">
+                <a16:creationId xmlns:a16="http://schemas.microsoft.com/office/drawing/2014/main" id="{0C94BD15-14C5-1374-709E-DCFB412B35BF}"/>
+              </a:ext>
+            </a:extLst>
+          </p:cNvPr>
+          <p:cNvPicPr>
+            <a:picLocks noChangeAspect="1"/>
+          </p:cNvPicPr>
+          <p:nvPr/>
+        </p:nvPicPr>
+        <p:blipFill>
+          <a:blip r:embed="rId3"/>
+          <a:stretch>
+            <a:fillRect/>
+          </a:stretch>
+        </p:blipFill>
+        <p:spPr>
+          <a:xfrm>
+            <a:off x="0" y="5487340"/>
+            <a:ext cx="12192000" cy="1365296"/>
+          </a:xfrm>
+          <a:prstGeom prst="rect">
+            <a:avLst/>
+          </a:prstGeom>
+        </p:spPr>
+      </p:pic>
     </p:spTree>
     <p:extLst>
       <p:ext uri="{BB962C8B-B14F-4D97-AF65-F5344CB8AC3E}">

</xml_diff>